<commit_message>
group work during class
</commit_message>
<xml_diff>
--- a/project_01_presentation.pptx
+++ b/project_01_presentation.pptx
@@ -113,6 +113,11 @@
       </a:defRPr>
     </a:lvl9pPr>
   </p:defaultTextStyle>
+  <p:extLst>
+    <p:ext uri="{EFAFB233-063F-42B5-8137-9DF3F51BA10A}">
+      <p15:sldGuideLst xmlns:p15="http://schemas.microsoft.com/office/powerpoint/2012/main"/>
+    </p:ext>
+  </p:extLst>
 </p:presentation>
 </file>
 
@@ -6945,6 +6950,11 @@
           <a:prstGeom prst="rect">
             <a:avLst/>
           </a:prstGeom>
+          <a:ln>
+            <a:solidFill>
+              <a:schemeClr val="bg1"/>
+            </a:solidFill>
+          </a:ln>
         </p:spPr>
       </p:pic>
     </p:spTree>

</xml_diff>

<commit_message>
final commit, group work
</commit_message>
<xml_diff>
--- a/project_01_presentation.pptx
+++ b/project_01_presentation.pptx
@@ -5,20 +5,22 @@
     <p:sldMasterId id="2147483660" r:id="rId1"/>
   </p:sldMasterIdLst>
   <p:notesMasterIdLst>
-    <p:notesMasterId r:id="rId13"/>
+    <p:notesMasterId r:id="rId15"/>
   </p:notesMasterIdLst>
   <p:sldIdLst>
     <p:sldId id="256" r:id="rId2"/>
     <p:sldId id="257" r:id="rId3"/>
-    <p:sldId id="258" r:id="rId4"/>
-    <p:sldId id="264" r:id="rId5"/>
-    <p:sldId id="265" r:id="rId6"/>
-    <p:sldId id="266" r:id="rId7"/>
-    <p:sldId id="268" r:id="rId8"/>
-    <p:sldId id="267" r:id="rId9"/>
-    <p:sldId id="262" r:id="rId10"/>
-    <p:sldId id="263" r:id="rId11"/>
-    <p:sldId id="269" r:id="rId12"/>
+    <p:sldId id="271" r:id="rId4"/>
+    <p:sldId id="258" r:id="rId5"/>
+    <p:sldId id="264" r:id="rId6"/>
+    <p:sldId id="265" r:id="rId7"/>
+    <p:sldId id="266" r:id="rId8"/>
+    <p:sldId id="268" r:id="rId9"/>
+    <p:sldId id="267" r:id="rId10"/>
+    <p:sldId id="262" r:id="rId11"/>
+    <p:sldId id="270" r:id="rId12"/>
+    <p:sldId id="269" r:id="rId13"/>
+    <p:sldId id="272" r:id="rId14"/>
   </p:sldIdLst>
   <p:sldSz cx="12192000" cy="6858000"/>
   <p:notesSz cx="6858000" cy="9144000"/>
@@ -207,7 +209,7 @@
           <a:p>
             <a:fld id="{A249AF06-C292-4A5D-B474-80499F1B144E}" type="datetimeFigureOut">
               <a:rPr lang="en-US" smtClean="0"/>
-              <a:t>7/18/2023</a:t>
+              <a:t>7/20/2023</a:t>
             </a:fld>
             <a:endParaRPr lang="en-US"/>
           </a:p>
@@ -629,7 +631,7 @@
           <a:p>
             <a:fld id="{FE1A4056-821B-4AEB-89B8-AA7542615A50}" type="slidenum">
               <a:rPr lang="en-US" smtClean="0"/>
-              <a:t>3</a:t>
+              <a:t>4</a:t>
             </a:fld>
             <a:endParaRPr lang="en-US"/>
           </a:p>
@@ -716,7 +718,7 @@
           <a:p>
             <a:fld id="{FE1A4056-821B-4AEB-89B8-AA7542615A50}" type="slidenum">
               <a:rPr lang="en-US" smtClean="0"/>
-              <a:t>4</a:t>
+              <a:t>5</a:t>
             </a:fld>
             <a:endParaRPr lang="en-US"/>
           </a:p>
@@ -803,7 +805,7 @@
           <a:p>
             <a:fld id="{FE1A4056-821B-4AEB-89B8-AA7542615A50}" type="slidenum">
               <a:rPr lang="en-US" smtClean="0"/>
-              <a:t>6</a:t>
+              <a:t>7</a:t>
             </a:fld>
             <a:endParaRPr lang="en-US"/>
           </a:p>
@@ -890,7 +892,7 @@
           <a:p>
             <a:fld id="{FE1A4056-821B-4AEB-89B8-AA7542615A50}" type="slidenum">
               <a:rPr lang="en-US" smtClean="0"/>
-              <a:t>8</a:t>
+              <a:t>9</a:t>
             </a:fld>
             <a:endParaRPr lang="en-US"/>
           </a:p>
@@ -977,7 +979,7 @@
           <a:p>
             <a:fld id="{FE1A4056-821B-4AEB-89B8-AA7542615A50}" type="slidenum">
               <a:rPr lang="en-US" smtClean="0"/>
-              <a:t>9</a:t>
+              <a:t>10</a:t>
             </a:fld>
             <a:endParaRPr lang="en-US"/>
           </a:p>
@@ -1064,7 +1066,7 @@
           <a:p>
             <a:fld id="{FE1A4056-821B-4AEB-89B8-AA7542615A50}" type="slidenum">
               <a:rPr lang="en-US" smtClean="0"/>
-              <a:t>10</a:t>
+              <a:t>11</a:t>
             </a:fld>
             <a:endParaRPr lang="en-US"/>
           </a:p>
@@ -1073,7 +1075,7 @@
     </p:spTree>
     <p:extLst>
       <p:ext uri="{BB962C8B-B14F-4D97-AF65-F5344CB8AC3E}">
-        <p14:creationId xmlns:p14="http://schemas.microsoft.com/office/powerpoint/2010/main" val="2842125836"/>
+        <p14:creationId xmlns:p14="http://schemas.microsoft.com/office/powerpoint/2010/main" val="2141984555"/>
       </p:ext>
     </p:extLst>
   </p:cSld>
@@ -1312,7 +1314,7 @@
           <a:p>
             <a:fld id="{5057948A-3458-44D5-940C-79EBABFAD5BC}" type="datetimeFigureOut">
               <a:rPr lang="en-US" smtClean="0"/>
-              <a:t>7/18/2023</a:t>
+              <a:t>7/20/2023</a:t>
             </a:fld>
             <a:endParaRPr lang="en-US"/>
           </a:p>
@@ -1646,7 +1648,7 @@
           <a:p>
             <a:fld id="{5057948A-3458-44D5-940C-79EBABFAD5BC}" type="datetimeFigureOut">
               <a:rPr lang="en-US" smtClean="0"/>
-              <a:t>7/18/2023</a:t>
+              <a:t>7/20/2023</a:t>
             </a:fld>
             <a:endParaRPr lang="en-US"/>
           </a:p>
@@ -1924,7 +1926,7 @@
           <a:p>
             <a:fld id="{5057948A-3458-44D5-940C-79EBABFAD5BC}" type="datetimeFigureOut">
               <a:rPr lang="en-US" smtClean="0"/>
-              <a:t>7/18/2023</a:t>
+              <a:t>7/20/2023</a:t>
             </a:fld>
             <a:endParaRPr lang="en-US"/>
           </a:p>
@@ -2492,7 +2494,7 @@
           <a:p>
             <a:fld id="{5057948A-3458-44D5-940C-79EBABFAD5BC}" type="datetimeFigureOut">
               <a:rPr lang="en-US" smtClean="0"/>
-              <a:t>7/18/2023</a:t>
+              <a:t>7/20/2023</a:t>
             </a:fld>
             <a:endParaRPr lang="en-US"/>
           </a:p>
@@ -2770,7 +2772,7 @@
           <a:p>
             <a:fld id="{5057948A-3458-44D5-940C-79EBABFAD5BC}" type="datetimeFigureOut">
               <a:rPr lang="en-US" smtClean="0"/>
-              <a:t>7/18/2023</a:t>
+              <a:t>7/20/2023</a:t>
             </a:fld>
             <a:endParaRPr lang="en-US"/>
           </a:p>
@@ -3332,7 +3334,7 @@
           <a:p>
             <a:fld id="{5057948A-3458-44D5-940C-79EBABFAD5BC}" type="datetimeFigureOut">
               <a:rPr lang="en-US" smtClean="0"/>
-              <a:t>7/18/2023</a:t>
+              <a:t>7/20/2023</a:t>
             </a:fld>
             <a:endParaRPr lang="en-US"/>
           </a:p>
@@ -3659,7 +3661,7 @@
           <a:p>
             <a:fld id="{5057948A-3458-44D5-940C-79EBABFAD5BC}" type="datetimeFigureOut">
               <a:rPr lang="en-US" smtClean="0"/>
-              <a:t>7/18/2023</a:t>
+              <a:t>7/20/2023</a:t>
             </a:fld>
             <a:endParaRPr lang="en-US"/>
           </a:p>
@@ -3836,7 +3838,7 @@
           <a:p>
             <a:fld id="{5057948A-3458-44D5-940C-79EBABFAD5BC}" type="datetimeFigureOut">
               <a:rPr lang="en-US" smtClean="0"/>
-              <a:t>7/18/2023</a:t>
+              <a:t>7/20/2023</a:t>
             </a:fld>
             <a:endParaRPr lang="en-US"/>
           </a:p>
@@ -4074,7 +4076,7 @@
           <a:p>
             <a:fld id="{5057948A-3458-44D5-940C-79EBABFAD5BC}" type="datetimeFigureOut">
               <a:rPr lang="en-US" smtClean="0"/>
-              <a:t>7/18/2023</a:t>
+              <a:t>7/20/2023</a:t>
             </a:fld>
             <a:endParaRPr lang="en-US"/>
           </a:p>
@@ -4274,7 +4276,7 @@
           <a:p>
             <a:fld id="{5057948A-3458-44D5-940C-79EBABFAD5BC}" type="datetimeFigureOut">
               <a:rPr lang="en-US" smtClean="0"/>
-              <a:t>7/18/2023</a:t>
+              <a:t>7/20/2023</a:t>
             </a:fld>
             <a:endParaRPr lang="en-US"/>
           </a:p>
@@ -4550,7 +4552,7 @@
           <a:p>
             <a:fld id="{5057948A-3458-44D5-940C-79EBABFAD5BC}" type="datetimeFigureOut">
               <a:rPr lang="en-US" smtClean="0"/>
-              <a:t>7/18/2023</a:t>
+              <a:t>7/20/2023</a:t>
             </a:fld>
             <a:endParaRPr lang="en-US"/>
           </a:p>
@@ -4816,7 +4818,7 @@
           <a:p>
             <a:fld id="{5057948A-3458-44D5-940C-79EBABFAD5BC}" type="datetimeFigureOut">
               <a:rPr lang="en-US" smtClean="0"/>
-              <a:t>7/18/2023</a:t>
+              <a:t>7/20/2023</a:t>
             </a:fld>
             <a:endParaRPr lang="en-US"/>
           </a:p>
@@ -5190,7 +5192,7 @@
           <a:p>
             <a:fld id="{5057948A-3458-44D5-940C-79EBABFAD5BC}" type="datetimeFigureOut">
               <a:rPr lang="en-US" smtClean="0"/>
-              <a:t>7/18/2023</a:t>
+              <a:t>7/20/2023</a:t>
             </a:fld>
             <a:endParaRPr lang="en-US"/>
           </a:p>
@@ -5338,7 +5340,7 @@
           <a:p>
             <a:fld id="{5057948A-3458-44D5-940C-79EBABFAD5BC}" type="datetimeFigureOut">
               <a:rPr lang="en-US" smtClean="0"/>
-              <a:t>7/18/2023</a:t>
+              <a:t>7/20/2023</a:t>
             </a:fld>
             <a:endParaRPr lang="en-US"/>
           </a:p>
@@ -5463,7 +5465,7 @@
           <a:p>
             <a:fld id="{5057948A-3458-44D5-940C-79EBABFAD5BC}" type="datetimeFigureOut">
               <a:rPr lang="en-US" smtClean="0"/>
-              <a:t>7/18/2023</a:t>
+              <a:t>7/20/2023</a:t>
             </a:fld>
             <a:endParaRPr lang="en-US"/>
           </a:p>
@@ -5748,7 +5750,7 @@
           <a:p>
             <a:fld id="{5057948A-3458-44D5-940C-79EBABFAD5BC}" type="datetimeFigureOut">
               <a:rPr lang="en-US" smtClean="0"/>
-              <a:t>7/18/2023</a:t>
+              <a:t>7/20/2023</a:t>
             </a:fld>
             <a:endParaRPr lang="en-US"/>
           </a:p>
@@ -6072,7 +6074,7 @@
           <a:p>
             <a:fld id="{5057948A-3458-44D5-940C-79EBABFAD5BC}" type="datetimeFigureOut">
               <a:rPr lang="en-US" smtClean="0"/>
-              <a:t>7/18/2023</a:t>
+              <a:t>7/20/2023</a:t>
             </a:fld>
             <a:endParaRPr lang="en-US"/>
           </a:p>
@@ -6286,7 +6288,7 @@
           <a:p>
             <a:fld id="{5057948A-3458-44D5-940C-79EBABFAD5BC}" type="datetimeFigureOut">
               <a:rPr lang="en-US" smtClean="0"/>
-              <a:t>7/18/2023</a:t>
+              <a:t>7/20/2023</a:t>
             </a:fld>
             <a:endParaRPr lang="en-US"/>
           </a:p>
@@ -6879,10 +6881,8 @@
             </a:r>
             <a:r>
               <a:rPr lang="en-US" dirty="0"/>
-              <a:t> gill, </a:t>
-            </a:r>
-          </a:p>
-          <a:p>
+              <a:t> gill, &amp; </a:t>
+            </a:r>
             <a:r>
               <a:rPr lang="en-US" dirty="0" err="1"/>
               <a:t>murtatha</a:t>
@@ -6895,10 +6895,7 @@
               <a:rPr lang="en-US" dirty="0" err="1"/>
               <a:t>alwan</a:t>
             </a:r>
-            <a:r>
-              <a:rPr lang="en-US" dirty="0"/>
-              <a:t>, &amp; Alicia hill</a:t>
-            </a:r>
+            <a:endParaRPr lang="en-US" dirty="0"/>
           </a:p>
         </p:txBody>
       </p:sp>
@@ -6955,40 +6952,317 @@
           <a:p>
             <a:r>
               <a:rPr lang="en-US" b="1" dirty="0"/>
-              <a:t>Do us residents work for us companies?</a:t>
-            </a:r>
-          </a:p>
-        </p:txBody>
-      </p:sp>
-      <p:sp>
-        <p:nvSpPr>
-          <p:cNvPr id="3" name="Content Placeholder 2">
+              <a:t>Do us companies hire us residents?</a:t>
+            </a:r>
+          </a:p>
+        </p:txBody>
+      </p:sp>
+      <p:pic>
+        <p:nvPicPr>
+          <p:cNvPr id="5" name="Content Placeholder 4">
             <a:extLst>
               <a:ext uri="{FF2B5EF4-FFF2-40B4-BE49-F238E27FC236}">
-                <a16:creationId xmlns:a16="http://schemas.microsoft.com/office/drawing/2014/main" id="{0CAFB276-8523-5C40-6590-894B45917CF9}"/>
+                <a16:creationId xmlns:a16="http://schemas.microsoft.com/office/drawing/2014/main" id="{CCD807CF-7155-A14D-C491-37F1FB68FBFD}"/>
               </a:ext>
             </a:extLst>
           </p:cNvPr>
-          <p:cNvSpPr>
-            <a:spLocks noGrp="1"/>
-          </p:cNvSpPr>
+          <p:cNvPicPr>
+            <a:picLocks noGrp="1" noChangeAspect="1"/>
+          </p:cNvPicPr>
           <p:nvPr>
             <p:ph idx="1"/>
           </p:nvPr>
-        </p:nvSpPr>
-        <p:spPr/>
-        <p:txBody>
-          <a:bodyPr anchor="t"/>
-          <a:lstStyle/>
-          <a:p>
-            <a:endParaRPr lang="en-US" dirty="0"/>
+        </p:nvPicPr>
+        <p:blipFill>
+          <a:blip r:embed="rId3">
+            <a:extLst>
+              <a:ext uri="{28A0092B-C50C-407E-A947-70E740481C1C}">
+                <a14:useLocalDpi xmlns:a14="http://schemas.microsoft.com/office/drawing/2010/main" val="0"/>
+              </a:ext>
+            </a:extLst>
+          </a:blip>
+          <a:stretch>
+            <a:fillRect/>
+          </a:stretch>
+        </p:blipFill>
+        <p:spPr>
+          <a:xfrm>
+            <a:off x="346075" y="1838810"/>
+            <a:ext cx="8898509" cy="4791506"/>
+          </a:xfrm>
+          <a:ln>
+            <a:solidFill>
+              <a:schemeClr val="bg1"/>
+            </a:solidFill>
+          </a:ln>
+        </p:spPr>
+      </p:pic>
+      <p:sp>
+        <p:nvSpPr>
+          <p:cNvPr id="7" name="Content Placeholder 7">
+            <a:extLst>
+              <a:ext uri="{FF2B5EF4-FFF2-40B4-BE49-F238E27FC236}">
+                <a16:creationId xmlns:a16="http://schemas.microsoft.com/office/drawing/2014/main" id="{DBD8DECF-5C14-0535-BA23-A321248F07A8}"/>
+              </a:ext>
+            </a:extLst>
+          </p:cNvPr>
+          <p:cNvSpPr txBox="1">
+            <a:spLocks/>
+          </p:cNvSpPr>
+          <p:nvPr/>
+        </p:nvSpPr>
+        <p:spPr>
+          <a:xfrm>
+            <a:off x="9427464" y="1752600"/>
+            <a:ext cx="2536462" cy="4877716"/>
+          </a:xfrm>
+          <a:prstGeom prst="rect">
+            <a:avLst/>
+          </a:prstGeom>
+        </p:spPr>
+        <p:txBody>
+          <a:bodyPr/>
+          <a:lstStyle>
+            <a:lvl1pPr marL="285750" indent="-285750" algn="l" defTabSz="457200" rtl="0" eaLnBrk="1" latinLnBrk="0" hangingPunct="1">
+              <a:spcBef>
+                <a:spcPts val="0"/>
+              </a:spcBef>
+              <a:spcAft>
+                <a:spcPts val="1000"/>
+              </a:spcAft>
+              <a:buClr>
+                <a:schemeClr val="tx1"/>
+              </a:buClr>
+              <a:buSzPct val="100000"/>
+              <a:buFont typeface="Arial"/>
+              <a:buChar char="•"/>
+              <a:defRPr sz="1800" kern="1200" cap="none">
+                <a:solidFill>
+                  <a:schemeClr val="tx1"/>
+                </a:solidFill>
+                <a:effectLst/>
+                <a:latin typeface="+mn-lt"/>
+                <a:ea typeface="+mn-ea"/>
+                <a:cs typeface="+mn-cs"/>
+              </a:defRPr>
+            </a:lvl1pPr>
+            <a:lvl2pPr marL="742950" indent="-285750" algn="l" defTabSz="457200" rtl="0" eaLnBrk="1" latinLnBrk="0" hangingPunct="1">
+              <a:spcBef>
+                <a:spcPts val="0"/>
+              </a:spcBef>
+              <a:spcAft>
+                <a:spcPts val="1000"/>
+              </a:spcAft>
+              <a:buClr>
+                <a:schemeClr val="tx1"/>
+              </a:buClr>
+              <a:buSzPct val="100000"/>
+              <a:buFont typeface="Arial"/>
+              <a:buChar char="•"/>
+              <a:defRPr sz="1600" kern="1200" cap="none">
+                <a:solidFill>
+                  <a:schemeClr val="tx1"/>
+                </a:solidFill>
+                <a:effectLst/>
+                <a:latin typeface="+mn-lt"/>
+                <a:ea typeface="+mn-ea"/>
+                <a:cs typeface="+mn-cs"/>
+              </a:defRPr>
+            </a:lvl2pPr>
+            <a:lvl3pPr marL="1200150" indent="-285750" algn="l" defTabSz="457200" rtl="0" eaLnBrk="1" latinLnBrk="0" hangingPunct="1">
+              <a:spcBef>
+                <a:spcPts val="0"/>
+              </a:spcBef>
+              <a:spcAft>
+                <a:spcPts val="1000"/>
+              </a:spcAft>
+              <a:buClr>
+                <a:schemeClr val="tx1"/>
+              </a:buClr>
+              <a:buSzPct val="100000"/>
+              <a:buFont typeface="Arial"/>
+              <a:buChar char="•"/>
+              <a:defRPr sz="1400" kern="1200" cap="none">
+                <a:solidFill>
+                  <a:schemeClr val="tx1"/>
+                </a:solidFill>
+                <a:effectLst/>
+                <a:latin typeface="+mn-lt"/>
+                <a:ea typeface="+mn-ea"/>
+                <a:cs typeface="+mn-cs"/>
+              </a:defRPr>
+            </a:lvl3pPr>
+            <a:lvl4pPr marL="1543050" indent="-171450" algn="l" defTabSz="457200" rtl="0" eaLnBrk="1" latinLnBrk="0" hangingPunct="1">
+              <a:spcBef>
+                <a:spcPts val="0"/>
+              </a:spcBef>
+              <a:spcAft>
+                <a:spcPts val="1000"/>
+              </a:spcAft>
+              <a:buClr>
+                <a:schemeClr val="tx1"/>
+              </a:buClr>
+              <a:buSzPct val="100000"/>
+              <a:buFont typeface="Arial"/>
+              <a:buChar char="•"/>
+              <a:defRPr sz="1200" kern="1200" cap="none">
+                <a:solidFill>
+                  <a:schemeClr val="tx1"/>
+                </a:solidFill>
+                <a:effectLst/>
+                <a:latin typeface="+mn-lt"/>
+                <a:ea typeface="+mn-ea"/>
+                <a:cs typeface="+mn-cs"/>
+              </a:defRPr>
+            </a:lvl4pPr>
+            <a:lvl5pPr marL="2000250" indent="-171450" algn="l" defTabSz="457200" rtl="0" eaLnBrk="1" latinLnBrk="0" hangingPunct="1">
+              <a:spcBef>
+                <a:spcPts val="0"/>
+              </a:spcBef>
+              <a:spcAft>
+                <a:spcPts val="1000"/>
+              </a:spcAft>
+              <a:buClr>
+                <a:schemeClr val="tx1"/>
+              </a:buClr>
+              <a:buSzPct val="100000"/>
+              <a:buFont typeface="Arial"/>
+              <a:buChar char="•"/>
+              <a:defRPr sz="1200" kern="1200" cap="none">
+                <a:solidFill>
+                  <a:schemeClr val="tx1"/>
+                </a:solidFill>
+                <a:effectLst/>
+                <a:latin typeface="+mn-lt"/>
+                <a:ea typeface="+mn-ea"/>
+                <a:cs typeface="+mn-cs"/>
+              </a:defRPr>
+            </a:lvl5pPr>
+            <a:lvl6pPr marL="2514600" indent="-228600" algn="l" defTabSz="457200" rtl="0" eaLnBrk="1" latinLnBrk="0" hangingPunct="1">
+              <a:spcBef>
+                <a:spcPts val="0"/>
+              </a:spcBef>
+              <a:spcAft>
+                <a:spcPts val="1000"/>
+              </a:spcAft>
+              <a:buClr>
+                <a:schemeClr val="tx1"/>
+              </a:buClr>
+              <a:buSzPct val="100000"/>
+              <a:buFont typeface="Arial"/>
+              <a:buChar char="•"/>
+              <a:defRPr sz="1200" kern="1200" cap="none">
+                <a:solidFill>
+                  <a:schemeClr val="tx1"/>
+                </a:solidFill>
+                <a:effectLst/>
+                <a:latin typeface="+mn-lt"/>
+                <a:ea typeface="+mn-ea"/>
+                <a:cs typeface="+mn-cs"/>
+              </a:defRPr>
+            </a:lvl6pPr>
+            <a:lvl7pPr marL="2971800" indent="-228600" algn="l" defTabSz="457200" rtl="0" eaLnBrk="1" latinLnBrk="0" hangingPunct="1">
+              <a:spcBef>
+                <a:spcPts val="0"/>
+              </a:spcBef>
+              <a:spcAft>
+                <a:spcPts val="1000"/>
+              </a:spcAft>
+              <a:buClr>
+                <a:schemeClr val="tx1"/>
+              </a:buClr>
+              <a:buSzPct val="100000"/>
+              <a:buFont typeface="Arial"/>
+              <a:buChar char="•"/>
+              <a:defRPr sz="1200" kern="1200" cap="none">
+                <a:solidFill>
+                  <a:schemeClr val="tx1"/>
+                </a:solidFill>
+                <a:effectLst/>
+                <a:latin typeface="+mn-lt"/>
+                <a:ea typeface="+mn-ea"/>
+                <a:cs typeface="+mn-cs"/>
+              </a:defRPr>
+            </a:lvl7pPr>
+            <a:lvl8pPr marL="3429000" indent="-228600" algn="l" defTabSz="457200" rtl="0" eaLnBrk="1" latinLnBrk="0" hangingPunct="1">
+              <a:spcBef>
+                <a:spcPts val="0"/>
+              </a:spcBef>
+              <a:spcAft>
+                <a:spcPts val="1000"/>
+              </a:spcAft>
+              <a:buClr>
+                <a:schemeClr val="tx1"/>
+              </a:buClr>
+              <a:buSzPct val="100000"/>
+              <a:buFont typeface="Arial"/>
+              <a:buChar char="•"/>
+              <a:defRPr sz="1200" kern="1200" cap="none">
+                <a:solidFill>
+                  <a:schemeClr val="tx1"/>
+                </a:solidFill>
+                <a:effectLst/>
+                <a:latin typeface="+mn-lt"/>
+                <a:ea typeface="+mn-ea"/>
+                <a:cs typeface="+mn-cs"/>
+              </a:defRPr>
+            </a:lvl8pPr>
+            <a:lvl9pPr marL="3886200" indent="-228600" algn="l" defTabSz="457200" rtl="0" eaLnBrk="1" latinLnBrk="0" hangingPunct="1">
+              <a:spcBef>
+                <a:spcPts val="0"/>
+              </a:spcBef>
+              <a:spcAft>
+                <a:spcPts val="1000"/>
+              </a:spcAft>
+              <a:buClr>
+                <a:schemeClr val="tx1"/>
+              </a:buClr>
+              <a:buSzPct val="100000"/>
+              <a:buFont typeface="Arial"/>
+              <a:buChar char="•"/>
+              <a:defRPr sz="1200" kern="1200" cap="none">
+                <a:solidFill>
+                  <a:schemeClr val="tx1"/>
+                </a:solidFill>
+                <a:effectLst/>
+                <a:latin typeface="+mn-lt"/>
+                <a:ea typeface="+mn-ea"/>
+                <a:cs typeface="+mn-cs"/>
+              </a:defRPr>
+            </a:lvl9pPr>
+          </a:lstStyle>
+          <a:p>
+            <a:r>
+              <a:rPr lang="en-US" dirty="0"/>
+              <a:t>US companies hired employees from 30 countries</a:t>
+            </a:r>
+          </a:p>
+          <a:p>
+            <a:r>
+              <a:rPr lang="en-US" dirty="0"/>
+              <a:t>98.1 % were US residents</a:t>
+            </a:r>
+          </a:p>
+          <a:p>
+            <a:r>
+              <a:rPr lang="en-US" dirty="0"/>
+              <a:t>Of note, though the UK was 2</a:t>
+            </a:r>
+            <a:r>
+              <a:rPr lang="en-US" baseline="30000" dirty="0"/>
+              <a:t>nd</a:t>
+            </a:r>
+            <a:r>
+              <a:rPr lang="en-US" dirty="0"/>
+              <a:t> in volume, no US companies hired UK residents</a:t>
+            </a:r>
           </a:p>
         </p:txBody>
       </p:sp>
     </p:spTree>
     <p:extLst>
       <p:ext uri="{BB962C8B-B14F-4D97-AF65-F5344CB8AC3E}">
-        <p14:creationId xmlns:p14="http://schemas.microsoft.com/office/powerpoint/2010/main" val="3435655970"/>
+        <p14:creationId xmlns:p14="http://schemas.microsoft.com/office/powerpoint/2010/main" val="3694235043"/>
       </p:ext>
     </p:extLst>
   </p:cSld>
@@ -7015,6 +7289,362 @@
           <a:chExt cx="0" cy="0"/>
         </a:xfrm>
       </p:grpSpPr>
+      <p:pic>
+        <p:nvPicPr>
+          <p:cNvPr id="4" name="Picture 3">
+            <a:extLst>
+              <a:ext uri="{FF2B5EF4-FFF2-40B4-BE49-F238E27FC236}">
+                <a16:creationId xmlns:a16="http://schemas.microsoft.com/office/drawing/2014/main" id="{799145F9-9E3D-0ED7-776C-B8E31EB95F04}"/>
+              </a:ext>
+            </a:extLst>
+          </p:cNvPr>
+          <p:cNvPicPr>
+            <a:picLocks noChangeAspect="1"/>
+          </p:cNvPicPr>
+          <p:nvPr/>
+        </p:nvPicPr>
+        <p:blipFill>
+          <a:blip r:embed="rId3">
+            <a:extLst>
+              <a:ext uri="{28A0092B-C50C-407E-A947-70E740481C1C}">
+                <a14:useLocalDpi xmlns:a14="http://schemas.microsoft.com/office/drawing/2010/main" val="0"/>
+              </a:ext>
+            </a:extLst>
+          </a:blip>
+          <a:stretch>
+            <a:fillRect/>
+          </a:stretch>
+        </p:blipFill>
+        <p:spPr>
+          <a:xfrm>
+            <a:off x="784987" y="1752600"/>
+            <a:ext cx="8176133" cy="4793770"/>
+          </a:xfrm>
+          <a:prstGeom prst="rect">
+            <a:avLst/>
+          </a:prstGeom>
+        </p:spPr>
+      </p:pic>
+      <p:sp>
+        <p:nvSpPr>
+          <p:cNvPr id="2" name="Title 1">
+            <a:extLst>
+              <a:ext uri="{FF2B5EF4-FFF2-40B4-BE49-F238E27FC236}">
+                <a16:creationId xmlns:a16="http://schemas.microsoft.com/office/drawing/2014/main" id="{33ED4251-AB16-D0F9-0F61-28488B332354}"/>
+              </a:ext>
+            </a:extLst>
+          </p:cNvPr>
+          <p:cNvSpPr>
+            <a:spLocks noGrp="1"/>
+          </p:cNvSpPr>
+          <p:nvPr>
+            <p:ph type="title"/>
+          </p:nvPr>
+        </p:nvSpPr>
+        <p:spPr/>
+        <p:txBody>
+          <a:bodyPr/>
+          <a:lstStyle/>
+          <a:p>
+            <a:r>
+              <a:rPr lang="en-US" b="1" dirty="0"/>
+              <a:t>Do us residents work for us companies?</a:t>
+            </a:r>
+          </a:p>
+        </p:txBody>
+      </p:sp>
+      <p:sp>
+        <p:nvSpPr>
+          <p:cNvPr id="7" name="Content Placeholder 7">
+            <a:extLst>
+              <a:ext uri="{FF2B5EF4-FFF2-40B4-BE49-F238E27FC236}">
+                <a16:creationId xmlns:a16="http://schemas.microsoft.com/office/drawing/2014/main" id="{DBD8DECF-5C14-0535-BA23-A321248F07A8}"/>
+              </a:ext>
+            </a:extLst>
+          </p:cNvPr>
+          <p:cNvSpPr txBox="1">
+            <a:spLocks/>
+          </p:cNvSpPr>
+          <p:nvPr/>
+        </p:nvSpPr>
+        <p:spPr>
+          <a:xfrm>
+            <a:off x="9317736" y="1710627"/>
+            <a:ext cx="2536462" cy="4877716"/>
+          </a:xfrm>
+          <a:prstGeom prst="rect">
+            <a:avLst/>
+          </a:prstGeom>
+        </p:spPr>
+        <p:txBody>
+          <a:bodyPr/>
+          <a:lstStyle>
+            <a:lvl1pPr marL="285750" indent="-285750" algn="l" defTabSz="457200" rtl="0" eaLnBrk="1" latinLnBrk="0" hangingPunct="1">
+              <a:spcBef>
+                <a:spcPts val="0"/>
+              </a:spcBef>
+              <a:spcAft>
+                <a:spcPts val="1000"/>
+              </a:spcAft>
+              <a:buClr>
+                <a:schemeClr val="tx1"/>
+              </a:buClr>
+              <a:buSzPct val="100000"/>
+              <a:buFont typeface="Arial"/>
+              <a:buChar char="•"/>
+              <a:defRPr sz="1800" kern="1200" cap="none">
+                <a:solidFill>
+                  <a:schemeClr val="tx1"/>
+                </a:solidFill>
+                <a:effectLst/>
+                <a:latin typeface="+mn-lt"/>
+                <a:ea typeface="+mn-ea"/>
+                <a:cs typeface="+mn-cs"/>
+              </a:defRPr>
+            </a:lvl1pPr>
+            <a:lvl2pPr marL="742950" indent="-285750" algn="l" defTabSz="457200" rtl="0" eaLnBrk="1" latinLnBrk="0" hangingPunct="1">
+              <a:spcBef>
+                <a:spcPts val="0"/>
+              </a:spcBef>
+              <a:spcAft>
+                <a:spcPts val="1000"/>
+              </a:spcAft>
+              <a:buClr>
+                <a:schemeClr val="tx1"/>
+              </a:buClr>
+              <a:buSzPct val="100000"/>
+              <a:buFont typeface="Arial"/>
+              <a:buChar char="•"/>
+              <a:defRPr sz="1600" kern="1200" cap="none">
+                <a:solidFill>
+                  <a:schemeClr val="tx1"/>
+                </a:solidFill>
+                <a:effectLst/>
+                <a:latin typeface="+mn-lt"/>
+                <a:ea typeface="+mn-ea"/>
+                <a:cs typeface="+mn-cs"/>
+              </a:defRPr>
+            </a:lvl2pPr>
+            <a:lvl3pPr marL="1200150" indent="-285750" algn="l" defTabSz="457200" rtl="0" eaLnBrk="1" latinLnBrk="0" hangingPunct="1">
+              <a:spcBef>
+                <a:spcPts val="0"/>
+              </a:spcBef>
+              <a:spcAft>
+                <a:spcPts val="1000"/>
+              </a:spcAft>
+              <a:buClr>
+                <a:schemeClr val="tx1"/>
+              </a:buClr>
+              <a:buSzPct val="100000"/>
+              <a:buFont typeface="Arial"/>
+              <a:buChar char="•"/>
+              <a:defRPr sz="1400" kern="1200" cap="none">
+                <a:solidFill>
+                  <a:schemeClr val="tx1"/>
+                </a:solidFill>
+                <a:effectLst/>
+                <a:latin typeface="+mn-lt"/>
+                <a:ea typeface="+mn-ea"/>
+                <a:cs typeface="+mn-cs"/>
+              </a:defRPr>
+            </a:lvl3pPr>
+            <a:lvl4pPr marL="1543050" indent="-171450" algn="l" defTabSz="457200" rtl="0" eaLnBrk="1" latinLnBrk="0" hangingPunct="1">
+              <a:spcBef>
+                <a:spcPts val="0"/>
+              </a:spcBef>
+              <a:spcAft>
+                <a:spcPts val="1000"/>
+              </a:spcAft>
+              <a:buClr>
+                <a:schemeClr val="tx1"/>
+              </a:buClr>
+              <a:buSzPct val="100000"/>
+              <a:buFont typeface="Arial"/>
+              <a:buChar char="•"/>
+              <a:defRPr sz="1200" kern="1200" cap="none">
+                <a:solidFill>
+                  <a:schemeClr val="tx1"/>
+                </a:solidFill>
+                <a:effectLst/>
+                <a:latin typeface="+mn-lt"/>
+                <a:ea typeface="+mn-ea"/>
+                <a:cs typeface="+mn-cs"/>
+              </a:defRPr>
+            </a:lvl4pPr>
+            <a:lvl5pPr marL="2000250" indent="-171450" algn="l" defTabSz="457200" rtl="0" eaLnBrk="1" latinLnBrk="0" hangingPunct="1">
+              <a:spcBef>
+                <a:spcPts val="0"/>
+              </a:spcBef>
+              <a:spcAft>
+                <a:spcPts val="1000"/>
+              </a:spcAft>
+              <a:buClr>
+                <a:schemeClr val="tx1"/>
+              </a:buClr>
+              <a:buSzPct val="100000"/>
+              <a:buFont typeface="Arial"/>
+              <a:buChar char="•"/>
+              <a:defRPr sz="1200" kern="1200" cap="none">
+                <a:solidFill>
+                  <a:schemeClr val="tx1"/>
+                </a:solidFill>
+                <a:effectLst/>
+                <a:latin typeface="+mn-lt"/>
+                <a:ea typeface="+mn-ea"/>
+                <a:cs typeface="+mn-cs"/>
+              </a:defRPr>
+            </a:lvl5pPr>
+            <a:lvl6pPr marL="2514600" indent="-228600" algn="l" defTabSz="457200" rtl="0" eaLnBrk="1" latinLnBrk="0" hangingPunct="1">
+              <a:spcBef>
+                <a:spcPts val="0"/>
+              </a:spcBef>
+              <a:spcAft>
+                <a:spcPts val="1000"/>
+              </a:spcAft>
+              <a:buClr>
+                <a:schemeClr val="tx1"/>
+              </a:buClr>
+              <a:buSzPct val="100000"/>
+              <a:buFont typeface="Arial"/>
+              <a:buChar char="•"/>
+              <a:defRPr sz="1200" kern="1200" cap="none">
+                <a:solidFill>
+                  <a:schemeClr val="tx1"/>
+                </a:solidFill>
+                <a:effectLst/>
+                <a:latin typeface="+mn-lt"/>
+                <a:ea typeface="+mn-ea"/>
+                <a:cs typeface="+mn-cs"/>
+              </a:defRPr>
+            </a:lvl6pPr>
+            <a:lvl7pPr marL="2971800" indent="-228600" algn="l" defTabSz="457200" rtl="0" eaLnBrk="1" latinLnBrk="0" hangingPunct="1">
+              <a:spcBef>
+                <a:spcPts val="0"/>
+              </a:spcBef>
+              <a:spcAft>
+                <a:spcPts val="1000"/>
+              </a:spcAft>
+              <a:buClr>
+                <a:schemeClr val="tx1"/>
+              </a:buClr>
+              <a:buSzPct val="100000"/>
+              <a:buFont typeface="Arial"/>
+              <a:buChar char="•"/>
+              <a:defRPr sz="1200" kern="1200" cap="none">
+                <a:solidFill>
+                  <a:schemeClr val="tx1"/>
+                </a:solidFill>
+                <a:effectLst/>
+                <a:latin typeface="+mn-lt"/>
+                <a:ea typeface="+mn-ea"/>
+                <a:cs typeface="+mn-cs"/>
+              </a:defRPr>
+            </a:lvl7pPr>
+            <a:lvl8pPr marL="3429000" indent="-228600" algn="l" defTabSz="457200" rtl="0" eaLnBrk="1" latinLnBrk="0" hangingPunct="1">
+              <a:spcBef>
+                <a:spcPts val="0"/>
+              </a:spcBef>
+              <a:spcAft>
+                <a:spcPts val="1000"/>
+              </a:spcAft>
+              <a:buClr>
+                <a:schemeClr val="tx1"/>
+              </a:buClr>
+              <a:buSzPct val="100000"/>
+              <a:buFont typeface="Arial"/>
+              <a:buChar char="•"/>
+              <a:defRPr sz="1200" kern="1200" cap="none">
+                <a:solidFill>
+                  <a:schemeClr val="tx1"/>
+                </a:solidFill>
+                <a:effectLst/>
+                <a:latin typeface="+mn-lt"/>
+                <a:ea typeface="+mn-ea"/>
+                <a:cs typeface="+mn-cs"/>
+              </a:defRPr>
+            </a:lvl8pPr>
+            <a:lvl9pPr marL="3886200" indent="-228600" algn="l" defTabSz="457200" rtl="0" eaLnBrk="1" latinLnBrk="0" hangingPunct="1">
+              <a:spcBef>
+                <a:spcPts val="0"/>
+              </a:spcBef>
+              <a:spcAft>
+                <a:spcPts val="1000"/>
+              </a:spcAft>
+              <a:buClr>
+                <a:schemeClr val="tx1"/>
+              </a:buClr>
+              <a:buSzPct val="100000"/>
+              <a:buFont typeface="Arial"/>
+              <a:buChar char="•"/>
+              <a:defRPr sz="1200" kern="1200" cap="none">
+                <a:solidFill>
+                  <a:schemeClr val="tx1"/>
+                </a:solidFill>
+                <a:effectLst/>
+                <a:latin typeface="+mn-lt"/>
+                <a:ea typeface="+mn-ea"/>
+                <a:cs typeface="+mn-cs"/>
+              </a:defRPr>
+            </a:lvl9pPr>
+          </a:lstStyle>
+          <a:p>
+            <a:r>
+              <a:rPr lang="en-US" dirty="0"/>
+              <a:t>US residents worked for 6 countries</a:t>
+            </a:r>
+          </a:p>
+          <a:p>
+            <a:r>
+              <a:rPr lang="en-US" dirty="0"/>
+              <a:t>99.8 % were US companies</a:t>
+            </a:r>
+          </a:p>
+          <a:p>
+            <a:r>
+              <a:rPr lang="en-US" dirty="0"/>
+              <a:t>Of note, though the UK was 2</a:t>
+            </a:r>
+            <a:r>
+              <a:rPr lang="en-US" baseline="30000" dirty="0"/>
+              <a:t>nd</a:t>
+            </a:r>
+            <a:r>
+              <a:rPr lang="en-US" dirty="0"/>
+              <a:t> in volume, no US residents worked for UK companies</a:t>
+            </a:r>
+          </a:p>
+        </p:txBody>
+      </p:sp>
+    </p:spTree>
+    <p:extLst>
+      <p:ext uri="{BB962C8B-B14F-4D97-AF65-F5344CB8AC3E}">
+        <p14:creationId xmlns:p14="http://schemas.microsoft.com/office/powerpoint/2010/main" val="1050704795"/>
+      </p:ext>
+    </p:extLst>
+  </p:cSld>
+  <p:clrMapOvr>
+    <a:masterClrMapping/>
+  </p:clrMapOvr>
+</p:sld>
+</file>
+
+<file path=ppt/slides/slide12.xml><?xml version="1.0" encoding="utf-8"?>
+<p:sld xmlns:a="http://schemas.openxmlformats.org/drawingml/2006/main" xmlns:r="http://schemas.openxmlformats.org/officeDocument/2006/relationships" xmlns:p="http://schemas.openxmlformats.org/presentationml/2006/main">
+  <p:cSld>
+    <p:spTree>
+      <p:nvGrpSpPr>
+        <p:cNvPr id="1" name=""/>
+        <p:cNvGrpSpPr/>
+        <p:nvPr/>
+      </p:nvGrpSpPr>
+      <p:grpSpPr>
+        <a:xfrm>
+          <a:off x="0" y="0"/>
+          <a:ext cx="0" cy="0"/>
+          <a:chOff x="0" y="0"/>
+          <a:chExt cx="0" cy="0"/>
+        </a:xfrm>
+      </p:grpSpPr>
       <p:sp>
         <p:nvSpPr>
           <p:cNvPr id="2" name="Title 1">
@@ -7038,7 +7668,7 @@
           <a:p>
             <a:r>
               <a:rPr lang="en-US" dirty="0"/>
-              <a:t>conclusions</a:t>
+              <a:t>CONCLUSIONS / implications</a:t>
             </a:r>
           </a:p>
         </p:txBody>
@@ -7061,10 +7691,40 @@
         </p:nvSpPr>
         <p:spPr/>
         <p:txBody>
-          <a:bodyPr/>
-          <a:lstStyle/>
-          <a:p>
-            <a:endParaRPr lang="en-US"/>
+          <a:bodyPr anchor="t"/>
+          <a:lstStyle/>
+          <a:p>
+            <a:r>
+              <a:rPr lang="en-US" dirty="0"/>
+              <a:t>Data science salaries have increased over time with medium size companies showing the highest growth and US companies consistently offering the most money</a:t>
+            </a:r>
+          </a:p>
+          <a:p>
+            <a:r>
+              <a:rPr lang="en-US" dirty="0"/>
+              <a:t>8.8% of data science jobs required entry-level experience, with a mean salary of $ 80,000 USD and a median salary of $ 70,000 USD</a:t>
+            </a:r>
+          </a:p>
+          <a:p>
+            <a:r>
+              <a:rPr lang="en-US" dirty="0"/>
+              <a:t>Data Analyst positions made up 20.6% of the 5 most common jobs, with the lowest mean salary among that group ( $ 110,000 USD)</a:t>
+            </a:r>
+          </a:p>
+          <a:p>
+            <a:r>
+              <a:rPr lang="en-US" dirty="0"/>
+              <a:t>Machine Learning Engineer positions made up 13.5% of the 5 most common jobs, with the highest mean salary among that group ($ 167,000 USD)</a:t>
+            </a:r>
+          </a:p>
+          <a:p>
+            <a:r>
+              <a:rPr lang="en-US" dirty="0"/>
+              <a:t>98.1% of the employees hired by US companies were also US residents, and 99.8% of the companies US residents worked for were US companies</a:t>
+            </a:r>
+          </a:p>
+          <a:p>
+            <a:endParaRPr lang="en-US" dirty="0"/>
           </a:p>
         </p:txBody>
       </p:sp>
@@ -7072,6 +7732,70 @@
     <p:extLst>
       <p:ext uri="{BB962C8B-B14F-4D97-AF65-F5344CB8AC3E}">
         <p14:creationId xmlns:p14="http://schemas.microsoft.com/office/powerpoint/2010/main" val="2869317015"/>
+      </p:ext>
+    </p:extLst>
+  </p:cSld>
+  <p:clrMapOvr>
+    <a:masterClrMapping/>
+  </p:clrMapOvr>
+</p:sld>
+</file>
+
+<file path=ppt/slides/slide13.xml><?xml version="1.0" encoding="utf-8"?>
+<p:sld xmlns:a="http://schemas.openxmlformats.org/drawingml/2006/main" xmlns:r="http://schemas.openxmlformats.org/officeDocument/2006/relationships" xmlns:p="http://schemas.openxmlformats.org/presentationml/2006/main">
+  <p:cSld>
+    <p:spTree>
+      <p:nvGrpSpPr>
+        <p:cNvPr id="1" name=""/>
+        <p:cNvGrpSpPr/>
+        <p:nvPr/>
+      </p:nvGrpSpPr>
+      <p:grpSpPr>
+        <a:xfrm>
+          <a:off x="0" y="0"/>
+          <a:ext cx="0" cy="0"/>
+          <a:chOff x="0" y="0"/>
+          <a:chExt cx="0" cy="0"/>
+        </a:xfrm>
+      </p:grpSpPr>
+      <p:sp>
+        <p:nvSpPr>
+          <p:cNvPr id="2" name="Title 1">
+            <a:extLst>
+              <a:ext uri="{FF2B5EF4-FFF2-40B4-BE49-F238E27FC236}">
+                <a16:creationId xmlns:a16="http://schemas.microsoft.com/office/drawing/2014/main" id="{76399CF5-EE81-BAF7-B100-F1571A5C4DCB}"/>
+              </a:ext>
+            </a:extLst>
+          </p:cNvPr>
+          <p:cNvSpPr>
+            <a:spLocks noGrp="1"/>
+          </p:cNvSpPr>
+          <p:nvPr>
+            <p:ph type="title"/>
+          </p:nvPr>
+        </p:nvSpPr>
+        <p:spPr>
+          <a:xfrm>
+            <a:off x="1030287" y="2700866"/>
+            <a:ext cx="10131425" cy="1456267"/>
+          </a:xfrm>
+        </p:spPr>
+        <p:txBody>
+          <a:bodyPr/>
+          <a:lstStyle/>
+          <a:p>
+            <a:pPr algn="ctr"/>
+            <a:r>
+              <a:rPr lang="en-US" dirty="0"/>
+              <a:t>Questions?</a:t>
+            </a:r>
+          </a:p>
+        </p:txBody>
+      </p:sp>
+    </p:spTree>
+    <p:extLst>
+      <p:ext uri="{BB962C8B-B14F-4D97-AF65-F5344CB8AC3E}">
+        <p14:creationId xmlns:p14="http://schemas.microsoft.com/office/powerpoint/2010/main" val="33330794"/>
       </p:ext>
     </p:extLst>
   </p:cSld>
@@ -7249,6 +7973,132 @@
           <p:cNvPr id="2" name="Title 1">
             <a:extLst>
               <a:ext uri="{FF2B5EF4-FFF2-40B4-BE49-F238E27FC236}">
+                <a16:creationId xmlns:a16="http://schemas.microsoft.com/office/drawing/2014/main" id="{4E076C54-272F-157F-9BF2-5CF391A3DAF8}"/>
+              </a:ext>
+            </a:extLst>
+          </p:cNvPr>
+          <p:cNvSpPr>
+            <a:spLocks noGrp="1"/>
+          </p:cNvSpPr>
+          <p:nvPr>
+            <p:ph type="title"/>
+          </p:nvPr>
+        </p:nvSpPr>
+        <p:spPr/>
+        <p:txBody>
+          <a:bodyPr/>
+          <a:lstStyle/>
+          <a:p>
+            <a:r>
+              <a:rPr lang="en-US" b="1" dirty="0"/>
+              <a:t>RESEARCH QUESTIONS</a:t>
+            </a:r>
+          </a:p>
+        </p:txBody>
+      </p:sp>
+      <p:sp>
+        <p:nvSpPr>
+          <p:cNvPr id="3" name="Content Placeholder 2">
+            <a:extLst>
+              <a:ext uri="{FF2B5EF4-FFF2-40B4-BE49-F238E27FC236}">
+                <a16:creationId xmlns:a16="http://schemas.microsoft.com/office/drawing/2014/main" id="{CB6FC26E-5442-3132-E098-DB4615A1EDF5}"/>
+              </a:ext>
+            </a:extLst>
+          </p:cNvPr>
+          <p:cNvSpPr>
+            <a:spLocks noGrp="1"/>
+          </p:cNvSpPr>
+          <p:nvPr>
+            <p:ph idx="1"/>
+          </p:nvPr>
+        </p:nvSpPr>
+        <p:spPr/>
+        <p:txBody>
+          <a:bodyPr anchor="t"/>
+          <a:lstStyle/>
+          <a:p>
+            <a:pPr marL="342900" indent="-342900">
+              <a:buFont typeface="+mj-lt"/>
+              <a:buAutoNum type="arabicPeriod"/>
+            </a:pPr>
+            <a:r>
+              <a:rPr lang="en-US" dirty="0"/>
+              <a:t>How have data science salaries changed over time?  (by country and company size)</a:t>
+            </a:r>
+          </a:p>
+          <a:p>
+            <a:pPr marL="342900" indent="-342900">
+              <a:buFont typeface="+mj-lt"/>
+              <a:buAutoNum type="arabicPeriod"/>
+            </a:pPr>
+            <a:r>
+              <a:rPr lang="en-US" dirty="0"/>
+              <a:t>What is the breakdown of experience level required for data science jobs, and how do they vary?</a:t>
+            </a:r>
+          </a:p>
+          <a:p>
+            <a:pPr marL="342900" indent="-342900">
+              <a:buFont typeface="+mj-lt"/>
+              <a:buAutoNum type="arabicPeriod"/>
+            </a:pPr>
+            <a:r>
+              <a:rPr lang="en-US" dirty="0"/>
+              <a:t>What is the breakdown of job titles for data science jobs, and how do they vary?</a:t>
+            </a:r>
+          </a:p>
+          <a:p>
+            <a:pPr marL="342900" indent="-342900">
+              <a:buFont typeface="+mj-lt"/>
+              <a:buAutoNum type="arabicPeriod"/>
+            </a:pPr>
+            <a:r>
+              <a:rPr lang="en-US" dirty="0"/>
+              <a:t>Do US companies hire US residents, and do US residents work for US companies?</a:t>
+            </a:r>
+          </a:p>
+          <a:p>
+            <a:pPr marL="0" indent="0">
+              <a:buNone/>
+            </a:pPr>
+            <a:endParaRPr lang="en-US" dirty="0"/>
+          </a:p>
+        </p:txBody>
+      </p:sp>
+    </p:spTree>
+    <p:extLst>
+      <p:ext uri="{BB962C8B-B14F-4D97-AF65-F5344CB8AC3E}">
+        <p14:creationId xmlns:p14="http://schemas.microsoft.com/office/powerpoint/2010/main" val="2669438108"/>
+      </p:ext>
+    </p:extLst>
+  </p:cSld>
+  <p:clrMapOvr>
+    <a:masterClrMapping/>
+  </p:clrMapOvr>
+</p:sld>
+</file>
+
+<file path=ppt/slides/slide4.xml><?xml version="1.0" encoding="utf-8"?>
+<p:sld xmlns:a="http://schemas.openxmlformats.org/drawingml/2006/main" xmlns:r="http://schemas.openxmlformats.org/officeDocument/2006/relationships" xmlns:p="http://schemas.openxmlformats.org/presentationml/2006/main">
+  <p:cSld>
+    <p:spTree>
+      <p:nvGrpSpPr>
+        <p:cNvPr id="1" name=""/>
+        <p:cNvGrpSpPr/>
+        <p:nvPr/>
+      </p:nvGrpSpPr>
+      <p:grpSpPr>
+        <a:xfrm>
+          <a:off x="0" y="0"/>
+          <a:ext cx="0" cy="0"/>
+          <a:chOff x="0" y="0"/>
+          <a:chExt cx="0" cy="0"/>
+        </a:xfrm>
+      </p:grpSpPr>
+      <p:sp>
+        <p:nvSpPr>
+          <p:cNvPr id="2" name="Title 1">
+            <a:extLst>
+              <a:ext uri="{FF2B5EF4-FFF2-40B4-BE49-F238E27FC236}">
                 <a16:creationId xmlns:a16="http://schemas.microsoft.com/office/drawing/2014/main" id="{33ED4251-AB16-D0F9-0F61-28488B332354}"/>
               </a:ext>
             </a:extLst>
@@ -7340,7 +8190,7 @@
           <a:p>
             <a:r>
               <a:rPr lang="en-US" dirty="0"/>
-              <a:t>There are 21 total countries included in the dataset</a:t>
+              <a:t>There are 71 total countries included in the dataset</a:t>
             </a:r>
           </a:p>
           <a:p>
@@ -7370,7 +8220,7 @@
 </p:sld>
 </file>
 
-<file path=ppt/slides/slide4.xml><?xml version="1.0" encoding="utf-8"?>
+<file path=ppt/slides/slide5.xml><?xml version="1.0" encoding="utf-8"?>
 <p:sld xmlns:a="http://schemas.openxmlformats.org/drawingml/2006/main" xmlns:r="http://schemas.openxmlformats.org/officeDocument/2006/relationships" xmlns:p="http://schemas.openxmlformats.org/presentationml/2006/main">
   <p:cSld>
     <p:spTree>
@@ -7526,18 +8376,10 @@
             <a:endParaRPr lang="en-US" dirty="0"/>
           </a:p>
           <a:p>
-            <a:pPr lvl="1"/>
-            <a:r>
-              <a:rPr lang="en-US" dirty="0">
-                <a:solidFill>
-                  <a:srgbClr val="FF0000"/>
-                </a:solidFill>
-              </a:rPr>
-              <a:t>COME BACK – t-test??</a:t>
-            </a:r>
-          </a:p>
-          <a:p>
-            <a:endParaRPr lang="en-US" dirty="0"/>
+            <a:r>
+              <a:rPr lang="en-US" dirty="0"/>
+              <a:t>Medium-sized companies showed the greatest increase, moving from lowest average salary in 2021 to highest in 2022 and 2023</a:t>
+            </a:r>
           </a:p>
         </p:txBody>
       </p:sp>
@@ -7554,7 +8396,7 @@
 </p:sld>
 </file>
 
-<file path=ppt/slides/slide5.xml><?xml version="1.0" encoding="utf-8"?>
+<file path=ppt/slides/slide6.xml><?xml version="1.0" encoding="utf-8"?>
 <p:sld xmlns:a="http://schemas.openxmlformats.org/drawingml/2006/main" xmlns:r="http://schemas.openxmlformats.org/officeDocument/2006/relationships" xmlns:p="http://schemas.openxmlformats.org/presentationml/2006/main">
   <p:cSld>
     <p:spTree>
@@ -7634,7 +8476,7 @@
           <a:lstStyle/>
           <a:p>
             <a:r>
-              <a:rPr lang="en-US" dirty="0"/>
+              <a:rPr lang="en-US" b="1" dirty="0"/>
               <a:t>What is the breakdown of experience level required for data science jobs?</a:t>
             </a:r>
           </a:p>
@@ -7962,7 +8804,7 @@
 </p:sld>
 </file>
 
-<file path=ppt/slides/slide6.xml><?xml version="1.0" encoding="utf-8"?>
+<file path=ppt/slides/slide7.xml><?xml version="1.0" encoding="utf-8"?>
 <p:sld xmlns:a="http://schemas.openxmlformats.org/drawingml/2006/main" xmlns:r="http://schemas.openxmlformats.org/officeDocument/2006/relationships" xmlns:p="http://schemas.openxmlformats.org/presentationml/2006/main">
   <p:cSld>
     <p:spTree>
@@ -8110,7 +8952,7 @@
 </p:sld>
 </file>
 
-<file path=ppt/slides/slide7.xml><?xml version="1.0" encoding="utf-8"?>
+<file path=ppt/slides/slide8.xml><?xml version="1.0" encoding="utf-8"?>
 <p:sld xmlns:a="http://schemas.openxmlformats.org/drawingml/2006/main" xmlns:r="http://schemas.openxmlformats.org/officeDocument/2006/relationships" xmlns:p="http://schemas.openxmlformats.org/presentationml/2006/main">
   <p:cSld>
     <p:spTree>
@@ -8231,8 +9073,8 @@
           <a:lstStyle/>
           <a:p>
             <a:r>
-              <a:rPr lang="en-US" dirty="0"/>
-              <a:t>What is the breakdown of Job Title required for data science jobs?</a:t>
+              <a:rPr lang="en-US" b="1" dirty="0"/>
+              <a:t>What is the breakdown of job titles for data science jobs?</a:t>
             </a:r>
           </a:p>
         </p:txBody>
@@ -8508,7 +9350,7 @@
 </p:sld>
 </file>
 
-<file path=ppt/slides/slide8.xml><?xml version="1.0" encoding="utf-8"?>
+<file path=ppt/slides/slide9.xml><?xml version="1.0" encoding="utf-8"?>
 <p:sld xmlns:a="http://schemas.openxmlformats.org/drawingml/2006/main" xmlns:r="http://schemas.openxmlformats.org/officeDocument/2006/relationships" xmlns:p="http://schemas.openxmlformats.org/presentationml/2006/main">
   <p:cSld>
     <p:spTree>
@@ -8627,6 +9469,25 @@
             </a:pPr>
             <a:r>
               <a:rPr lang="en-US" dirty="0"/>
+              <a:t>The top 5 most common data science jobs made up 67.5% of all jobs in the dataset</a:t>
+            </a:r>
+          </a:p>
+          <a:p>
+            <a:pPr>
+              <a:spcAft>
+                <a:spcPts val="400"/>
+              </a:spcAft>
+            </a:pPr>
+            <a:endParaRPr lang="en-US" dirty="0"/>
+          </a:p>
+          <a:p>
+            <a:pPr>
+              <a:spcAft>
+                <a:spcPts val="400"/>
+              </a:spcAft>
+            </a:pPr>
+            <a:r>
+              <a:rPr lang="en-US" dirty="0"/>
               <a:t>The ANOVA test showed a statistically significant difference in salary based on job title</a:t>
             </a:r>
           </a:p>
@@ -8647,366 +9508,6 @@
     <p:extLst>
       <p:ext uri="{BB962C8B-B14F-4D97-AF65-F5344CB8AC3E}">
         <p14:creationId xmlns:p14="http://schemas.microsoft.com/office/powerpoint/2010/main" val="3266698319"/>
-      </p:ext>
-    </p:extLst>
-  </p:cSld>
-  <p:clrMapOvr>
-    <a:masterClrMapping/>
-  </p:clrMapOvr>
-</p:sld>
-</file>
-
-<file path=ppt/slides/slide9.xml><?xml version="1.0" encoding="utf-8"?>
-<p:sld xmlns:a="http://schemas.openxmlformats.org/drawingml/2006/main" xmlns:r="http://schemas.openxmlformats.org/officeDocument/2006/relationships" xmlns:p="http://schemas.openxmlformats.org/presentationml/2006/main">
-  <p:cSld>
-    <p:spTree>
-      <p:nvGrpSpPr>
-        <p:cNvPr id="1" name=""/>
-        <p:cNvGrpSpPr/>
-        <p:nvPr/>
-      </p:nvGrpSpPr>
-      <p:grpSpPr>
-        <a:xfrm>
-          <a:off x="0" y="0"/>
-          <a:ext cx="0" cy="0"/>
-          <a:chOff x="0" y="0"/>
-          <a:chExt cx="0" cy="0"/>
-        </a:xfrm>
-      </p:grpSpPr>
-      <p:sp>
-        <p:nvSpPr>
-          <p:cNvPr id="2" name="Title 1">
-            <a:extLst>
-              <a:ext uri="{FF2B5EF4-FFF2-40B4-BE49-F238E27FC236}">
-                <a16:creationId xmlns:a16="http://schemas.microsoft.com/office/drawing/2014/main" id="{33ED4251-AB16-D0F9-0F61-28488B332354}"/>
-              </a:ext>
-            </a:extLst>
-          </p:cNvPr>
-          <p:cNvSpPr>
-            <a:spLocks noGrp="1"/>
-          </p:cNvSpPr>
-          <p:nvPr>
-            <p:ph type="title"/>
-          </p:nvPr>
-        </p:nvSpPr>
-        <p:spPr/>
-        <p:txBody>
-          <a:bodyPr/>
-          <a:lstStyle/>
-          <a:p>
-            <a:r>
-              <a:rPr lang="en-US" b="1" dirty="0"/>
-              <a:t>Do us companies hire us residents?</a:t>
-            </a:r>
-          </a:p>
-        </p:txBody>
-      </p:sp>
-      <p:pic>
-        <p:nvPicPr>
-          <p:cNvPr id="5" name="Content Placeholder 4">
-            <a:extLst>
-              <a:ext uri="{FF2B5EF4-FFF2-40B4-BE49-F238E27FC236}">
-                <a16:creationId xmlns:a16="http://schemas.microsoft.com/office/drawing/2014/main" id="{CCD807CF-7155-A14D-C491-37F1FB68FBFD}"/>
-              </a:ext>
-            </a:extLst>
-          </p:cNvPr>
-          <p:cNvPicPr>
-            <a:picLocks noGrp="1" noChangeAspect="1"/>
-          </p:cNvPicPr>
-          <p:nvPr>
-            <p:ph idx="1"/>
-          </p:nvPr>
-        </p:nvPicPr>
-        <p:blipFill>
-          <a:blip r:embed="rId3">
-            <a:extLst>
-              <a:ext uri="{28A0092B-C50C-407E-A947-70E740481C1C}">
-                <a14:useLocalDpi xmlns:a14="http://schemas.microsoft.com/office/drawing/2010/main" val="0"/>
-              </a:ext>
-            </a:extLst>
-          </a:blip>
-          <a:stretch>
-            <a:fillRect/>
-          </a:stretch>
-        </p:blipFill>
-        <p:spPr>
-          <a:xfrm>
-            <a:off x="346075" y="1838810"/>
-            <a:ext cx="8898509" cy="4791506"/>
-          </a:xfrm>
-          <a:ln>
-            <a:solidFill>
-              <a:schemeClr val="bg1"/>
-            </a:solidFill>
-          </a:ln>
-        </p:spPr>
-      </p:pic>
-      <p:sp>
-        <p:nvSpPr>
-          <p:cNvPr id="7" name="Content Placeholder 7">
-            <a:extLst>
-              <a:ext uri="{FF2B5EF4-FFF2-40B4-BE49-F238E27FC236}">
-                <a16:creationId xmlns:a16="http://schemas.microsoft.com/office/drawing/2014/main" id="{DBD8DECF-5C14-0535-BA23-A321248F07A8}"/>
-              </a:ext>
-            </a:extLst>
-          </p:cNvPr>
-          <p:cNvSpPr txBox="1">
-            <a:spLocks/>
-          </p:cNvSpPr>
-          <p:nvPr/>
-        </p:nvSpPr>
-        <p:spPr>
-          <a:xfrm>
-            <a:off x="9427464" y="1752600"/>
-            <a:ext cx="2536462" cy="4877716"/>
-          </a:xfrm>
-          <a:prstGeom prst="rect">
-            <a:avLst/>
-          </a:prstGeom>
-        </p:spPr>
-        <p:txBody>
-          <a:bodyPr/>
-          <a:lstStyle>
-            <a:lvl1pPr marL="285750" indent="-285750" algn="l" defTabSz="457200" rtl="0" eaLnBrk="1" latinLnBrk="0" hangingPunct="1">
-              <a:spcBef>
-                <a:spcPts val="0"/>
-              </a:spcBef>
-              <a:spcAft>
-                <a:spcPts val="1000"/>
-              </a:spcAft>
-              <a:buClr>
-                <a:schemeClr val="tx1"/>
-              </a:buClr>
-              <a:buSzPct val="100000"/>
-              <a:buFont typeface="Arial"/>
-              <a:buChar char="•"/>
-              <a:defRPr sz="1800" kern="1200" cap="none">
-                <a:solidFill>
-                  <a:schemeClr val="tx1"/>
-                </a:solidFill>
-                <a:effectLst/>
-                <a:latin typeface="+mn-lt"/>
-                <a:ea typeface="+mn-ea"/>
-                <a:cs typeface="+mn-cs"/>
-              </a:defRPr>
-            </a:lvl1pPr>
-            <a:lvl2pPr marL="742950" indent="-285750" algn="l" defTabSz="457200" rtl="0" eaLnBrk="1" latinLnBrk="0" hangingPunct="1">
-              <a:spcBef>
-                <a:spcPts val="0"/>
-              </a:spcBef>
-              <a:spcAft>
-                <a:spcPts val="1000"/>
-              </a:spcAft>
-              <a:buClr>
-                <a:schemeClr val="tx1"/>
-              </a:buClr>
-              <a:buSzPct val="100000"/>
-              <a:buFont typeface="Arial"/>
-              <a:buChar char="•"/>
-              <a:defRPr sz="1600" kern="1200" cap="none">
-                <a:solidFill>
-                  <a:schemeClr val="tx1"/>
-                </a:solidFill>
-                <a:effectLst/>
-                <a:latin typeface="+mn-lt"/>
-                <a:ea typeface="+mn-ea"/>
-                <a:cs typeface="+mn-cs"/>
-              </a:defRPr>
-            </a:lvl2pPr>
-            <a:lvl3pPr marL="1200150" indent="-285750" algn="l" defTabSz="457200" rtl="0" eaLnBrk="1" latinLnBrk="0" hangingPunct="1">
-              <a:spcBef>
-                <a:spcPts val="0"/>
-              </a:spcBef>
-              <a:spcAft>
-                <a:spcPts val="1000"/>
-              </a:spcAft>
-              <a:buClr>
-                <a:schemeClr val="tx1"/>
-              </a:buClr>
-              <a:buSzPct val="100000"/>
-              <a:buFont typeface="Arial"/>
-              <a:buChar char="•"/>
-              <a:defRPr sz="1400" kern="1200" cap="none">
-                <a:solidFill>
-                  <a:schemeClr val="tx1"/>
-                </a:solidFill>
-                <a:effectLst/>
-                <a:latin typeface="+mn-lt"/>
-                <a:ea typeface="+mn-ea"/>
-                <a:cs typeface="+mn-cs"/>
-              </a:defRPr>
-            </a:lvl3pPr>
-            <a:lvl4pPr marL="1543050" indent="-171450" algn="l" defTabSz="457200" rtl="0" eaLnBrk="1" latinLnBrk="0" hangingPunct="1">
-              <a:spcBef>
-                <a:spcPts val="0"/>
-              </a:spcBef>
-              <a:spcAft>
-                <a:spcPts val="1000"/>
-              </a:spcAft>
-              <a:buClr>
-                <a:schemeClr val="tx1"/>
-              </a:buClr>
-              <a:buSzPct val="100000"/>
-              <a:buFont typeface="Arial"/>
-              <a:buChar char="•"/>
-              <a:defRPr sz="1200" kern="1200" cap="none">
-                <a:solidFill>
-                  <a:schemeClr val="tx1"/>
-                </a:solidFill>
-                <a:effectLst/>
-                <a:latin typeface="+mn-lt"/>
-                <a:ea typeface="+mn-ea"/>
-                <a:cs typeface="+mn-cs"/>
-              </a:defRPr>
-            </a:lvl4pPr>
-            <a:lvl5pPr marL="2000250" indent="-171450" algn="l" defTabSz="457200" rtl="0" eaLnBrk="1" latinLnBrk="0" hangingPunct="1">
-              <a:spcBef>
-                <a:spcPts val="0"/>
-              </a:spcBef>
-              <a:spcAft>
-                <a:spcPts val="1000"/>
-              </a:spcAft>
-              <a:buClr>
-                <a:schemeClr val="tx1"/>
-              </a:buClr>
-              <a:buSzPct val="100000"/>
-              <a:buFont typeface="Arial"/>
-              <a:buChar char="•"/>
-              <a:defRPr sz="1200" kern="1200" cap="none">
-                <a:solidFill>
-                  <a:schemeClr val="tx1"/>
-                </a:solidFill>
-                <a:effectLst/>
-                <a:latin typeface="+mn-lt"/>
-                <a:ea typeface="+mn-ea"/>
-                <a:cs typeface="+mn-cs"/>
-              </a:defRPr>
-            </a:lvl5pPr>
-            <a:lvl6pPr marL="2514600" indent="-228600" algn="l" defTabSz="457200" rtl="0" eaLnBrk="1" latinLnBrk="0" hangingPunct="1">
-              <a:spcBef>
-                <a:spcPts val="0"/>
-              </a:spcBef>
-              <a:spcAft>
-                <a:spcPts val="1000"/>
-              </a:spcAft>
-              <a:buClr>
-                <a:schemeClr val="tx1"/>
-              </a:buClr>
-              <a:buSzPct val="100000"/>
-              <a:buFont typeface="Arial"/>
-              <a:buChar char="•"/>
-              <a:defRPr sz="1200" kern="1200" cap="none">
-                <a:solidFill>
-                  <a:schemeClr val="tx1"/>
-                </a:solidFill>
-                <a:effectLst/>
-                <a:latin typeface="+mn-lt"/>
-                <a:ea typeface="+mn-ea"/>
-                <a:cs typeface="+mn-cs"/>
-              </a:defRPr>
-            </a:lvl6pPr>
-            <a:lvl7pPr marL="2971800" indent="-228600" algn="l" defTabSz="457200" rtl="0" eaLnBrk="1" latinLnBrk="0" hangingPunct="1">
-              <a:spcBef>
-                <a:spcPts val="0"/>
-              </a:spcBef>
-              <a:spcAft>
-                <a:spcPts val="1000"/>
-              </a:spcAft>
-              <a:buClr>
-                <a:schemeClr val="tx1"/>
-              </a:buClr>
-              <a:buSzPct val="100000"/>
-              <a:buFont typeface="Arial"/>
-              <a:buChar char="•"/>
-              <a:defRPr sz="1200" kern="1200" cap="none">
-                <a:solidFill>
-                  <a:schemeClr val="tx1"/>
-                </a:solidFill>
-                <a:effectLst/>
-                <a:latin typeface="+mn-lt"/>
-                <a:ea typeface="+mn-ea"/>
-                <a:cs typeface="+mn-cs"/>
-              </a:defRPr>
-            </a:lvl7pPr>
-            <a:lvl8pPr marL="3429000" indent="-228600" algn="l" defTabSz="457200" rtl="0" eaLnBrk="1" latinLnBrk="0" hangingPunct="1">
-              <a:spcBef>
-                <a:spcPts val="0"/>
-              </a:spcBef>
-              <a:spcAft>
-                <a:spcPts val="1000"/>
-              </a:spcAft>
-              <a:buClr>
-                <a:schemeClr val="tx1"/>
-              </a:buClr>
-              <a:buSzPct val="100000"/>
-              <a:buFont typeface="Arial"/>
-              <a:buChar char="•"/>
-              <a:defRPr sz="1200" kern="1200" cap="none">
-                <a:solidFill>
-                  <a:schemeClr val="tx1"/>
-                </a:solidFill>
-                <a:effectLst/>
-                <a:latin typeface="+mn-lt"/>
-                <a:ea typeface="+mn-ea"/>
-                <a:cs typeface="+mn-cs"/>
-              </a:defRPr>
-            </a:lvl8pPr>
-            <a:lvl9pPr marL="3886200" indent="-228600" algn="l" defTabSz="457200" rtl="0" eaLnBrk="1" latinLnBrk="0" hangingPunct="1">
-              <a:spcBef>
-                <a:spcPts val="0"/>
-              </a:spcBef>
-              <a:spcAft>
-                <a:spcPts val="1000"/>
-              </a:spcAft>
-              <a:buClr>
-                <a:schemeClr val="tx1"/>
-              </a:buClr>
-              <a:buSzPct val="100000"/>
-              <a:buFont typeface="Arial"/>
-              <a:buChar char="•"/>
-              <a:defRPr sz="1200" kern="1200" cap="none">
-                <a:solidFill>
-                  <a:schemeClr val="tx1"/>
-                </a:solidFill>
-                <a:effectLst/>
-                <a:latin typeface="+mn-lt"/>
-                <a:ea typeface="+mn-ea"/>
-                <a:cs typeface="+mn-cs"/>
-              </a:defRPr>
-            </a:lvl9pPr>
-          </a:lstStyle>
-          <a:p>
-            <a:r>
-              <a:rPr lang="en-US" dirty="0"/>
-              <a:t>US companies hired employees from ___# countries</a:t>
-            </a:r>
-          </a:p>
-          <a:p>
-            <a:r>
-              <a:rPr lang="en-US" dirty="0"/>
-              <a:t>____% were US residents</a:t>
-            </a:r>
-          </a:p>
-          <a:p>
-            <a:r>
-              <a:rPr lang="en-US" dirty="0"/>
-              <a:t>Of note, though the UK was 2</a:t>
-            </a:r>
-            <a:r>
-              <a:rPr lang="en-US" baseline="30000" dirty="0"/>
-              <a:t>nd</a:t>
-            </a:r>
-            <a:r>
-              <a:rPr lang="en-US" dirty="0"/>
-              <a:t> in volume, no US companies hired UK residents</a:t>
-            </a:r>
-          </a:p>
-        </p:txBody>
-      </p:sp>
-    </p:spTree>
-    <p:extLst>
-      <p:ext uri="{BB962C8B-B14F-4D97-AF65-F5344CB8AC3E}">
-        <p14:creationId xmlns:p14="http://schemas.microsoft.com/office/powerpoint/2010/main" val="3694235043"/>
       </p:ext>
     </p:extLst>
   </p:cSld>

</xml_diff>